<commit_message>
updated link to tutorial in modules page
</commit_message>
<xml_diff>
--- a/Slides/Lesson 5.3 Testing Systems.pptx
+++ b/Slides/Lesson 5.3 Testing Systems.pptx
@@ -1059,6 +1059,22 @@
               <a:rPr lang="en-US" dirty="0"/>
               <a:t>. It is used for testing a large suite of tests where stubs are not sufficient. </a:t>
             </a:r>
+          </a:p>
+          <a:p>
+            <a:r>
+              <a:rPr lang="en-US" dirty="0">
+                <a:latin typeface="+mn-lt"/>
+              </a:rPr>
+              <a:t>In jest, when you use a spy on a function, the function actually executes and spy keeps information related to those executions. On the other hand, a mock replaces the function that you </a:t>
+            </a:r>
+            <a:r>
+              <a:rPr lang="en-US">
+                <a:latin typeface="+mn-lt"/>
+              </a:rPr>
+              <a:t>are mocking.</a:t>
+            </a:r>
+          </a:p>
+          <a:p>
             <a:endParaRPr lang="en-US" dirty="0">
               <a:latin typeface="+mn-lt"/>
             </a:endParaRPr>
@@ -15534,7 +15550,7 @@
             <a:effectLst/>
             <a:extLst>
               <a:ext uri="{C572A759-6A51-4108-AA02-DFA0A04FC94B}">
-                <ma14:wrappingTextBoxFlag xmlns:ma14="http://schemas.microsoft.com/office/mac/drawingml/2011/main" xmlns:a14="http://schemas.microsoft.com/office/drawing/2010/main" xmlns:m="http://schemas.openxmlformats.org/officeDocument/2006/math" xmlns="" val="1"/>
+                <ma14:wrappingTextBoxFlag xmlns="" xmlns:m="http://schemas.openxmlformats.org/officeDocument/2006/math" xmlns:a14="http://schemas.microsoft.com/office/drawing/2010/main" xmlns:ma14="http://schemas.microsoft.com/office/mac/drawingml/2011/main" val="1"/>
               </a:ext>
             </a:extLst>
           </p:spPr>
@@ -15595,7 +15611,7 @@
             <a:effectLst/>
             <a:extLst>
               <a:ext uri="{C572A759-6A51-4108-AA02-DFA0A04FC94B}">
-                <ma14:wrappingTextBoxFlag xmlns:ma14="http://schemas.microsoft.com/office/mac/drawingml/2011/main" xmlns:a14="http://schemas.microsoft.com/office/drawing/2010/main" xmlns:m="http://schemas.openxmlformats.org/officeDocument/2006/math" xmlns="" val="1"/>
+                <ma14:wrappingTextBoxFlag xmlns="" xmlns:m="http://schemas.openxmlformats.org/officeDocument/2006/math" xmlns:a14="http://schemas.microsoft.com/office/drawing/2010/main" xmlns:ma14="http://schemas.microsoft.com/office/mac/drawingml/2011/main" val="1"/>
               </a:ext>
             </a:extLst>
           </p:spPr>
@@ -15656,7 +15672,7 @@
             <a:effectLst/>
             <a:extLst>
               <a:ext uri="{C572A759-6A51-4108-AA02-DFA0A04FC94B}">
-                <ma14:wrappingTextBoxFlag xmlns:ma14="http://schemas.microsoft.com/office/mac/drawingml/2011/main" xmlns:a14="http://schemas.microsoft.com/office/drawing/2010/main" xmlns:m="http://schemas.openxmlformats.org/officeDocument/2006/math" xmlns="" val="1"/>
+                <ma14:wrappingTextBoxFlag xmlns="" xmlns:m="http://schemas.openxmlformats.org/officeDocument/2006/math" xmlns:a14="http://schemas.microsoft.com/office/drawing/2010/main" xmlns:ma14="http://schemas.microsoft.com/office/mac/drawingml/2011/main" val="1"/>
               </a:ext>
             </a:extLst>
           </p:spPr>

</xml_diff>